<commit_message>
Add python logo in presentation
</commit_message>
<xml_diff>
--- a/Documents/Timeless_Navigators.pptx
+++ b/Documents/Timeless_Navigators.pptx
@@ -38189,7 +38189,7 @@
           </p:cNvPicPr>
           <p:nvPr/>
         </p:nvPicPr>
-        <p:blipFill>
+        <p:blipFill rotWithShape="1">
           <a:blip r:embed="rId6">
             <a:extLst>
               <a:ext uri="{28A0092B-C50C-407E-A947-70E740481C1C}">
@@ -38197,15 +38197,13 @@
               </a:ext>
             </a:extLst>
           </a:blip>
-          <a:srcRect/>
-          <a:stretch>
-            <a:fillRect/>
-          </a:stretch>
+          <a:srcRect l="17714" t="-3272" r="9102" b="3272"/>
+          <a:stretch/>
         </p:blipFill>
         <p:spPr bwMode="auto">
           <a:xfrm>
-            <a:off x="263958" y="2837161"/>
-            <a:ext cx="2311185" cy="1294264"/>
+            <a:off x="225218" y="2760722"/>
+            <a:ext cx="1691402" cy="1294264"/>
           </a:xfrm>
           <a:prstGeom prst="rect">
             <a:avLst/>
@@ -38251,7 +38249,7 @@
         </p:blipFill>
         <p:spPr bwMode="auto">
           <a:xfrm>
-            <a:off x="4536559" y="2793273"/>
+            <a:off x="5035203" y="2798399"/>
             <a:ext cx="2166434" cy="1350207"/>
           </a:xfrm>
           <a:prstGeom prst="rect">
@@ -38298,7 +38296,7 @@
         </p:blipFill>
         <p:spPr bwMode="auto">
           <a:xfrm>
-            <a:off x="2701712" y="2704090"/>
+            <a:off x="2008412" y="2680486"/>
             <a:ext cx="1635123" cy="1515822"/>
           </a:xfrm>
           <a:prstGeom prst="rect">
@@ -38358,7 +38356,7 @@
         </p:blipFill>
         <p:spPr bwMode="auto">
           <a:xfrm>
-            <a:off x="6734514" y="2592578"/>
+            <a:off x="7083824" y="2557661"/>
             <a:ext cx="1744546" cy="1744546"/>
           </a:xfrm>
           <a:prstGeom prst="rect">
@@ -38425,6 +38423,51 @@
           <a:xfrm>
             <a:off x="4327190" y="1163982"/>
             <a:ext cx="1396054" cy="1515823"/>
+          </a:xfrm>
+          <a:prstGeom prst="rect">
+            <a:avLst/>
+          </a:prstGeom>
+          <a:noFill/>
+          <a:extLst>
+            <a:ext uri="{909E8E84-426E-40DD-AFC4-6F175D3DCCD1}">
+              <a14:hiddenFill xmlns:a14="http://schemas.microsoft.com/office/drawing/2010/main">
+                <a:solidFill>
+                  <a:srgbClr val="FFFFFF"/>
+                </a:solidFill>
+              </a14:hiddenFill>
+            </a:ext>
+          </a:extLst>
+        </p:spPr>
+      </p:pic>
+      <p:pic>
+        <p:nvPicPr>
+          <p:cNvPr id="1026" name="Picture 2" descr="What is Python Coding?">
+            <a:extLst>
+              <a:ext uri="{FF2B5EF4-FFF2-40B4-BE49-F238E27FC236}">
+                <a16:creationId xmlns:a16="http://schemas.microsoft.com/office/drawing/2014/main" id="{A1E0E734-564B-40C6-B520-D2BD6DD53082}"/>
+              </a:ext>
+            </a:extLst>
+          </p:cNvPr>
+          <p:cNvPicPr>
+            <a:picLocks noChangeAspect="1" noChangeArrowheads="1"/>
+          </p:cNvPicPr>
+          <p:nvPr/>
+        </p:nvPicPr>
+        <p:blipFill rotWithShape="1">
+          <a:blip r:embed="rId13">
+            <a:extLst>
+              <a:ext uri="{28A0092B-C50C-407E-A947-70E740481C1C}">
+                <a14:useLocalDpi xmlns:a14="http://schemas.microsoft.com/office/drawing/2010/main" val="0"/>
+              </a:ext>
+            </a:extLst>
+          </a:blip>
+          <a:srcRect l="19054" t="18599" r="18598" b="19729"/>
+          <a:stretch/>
+        </p:blipFill>
+        <p:spPr bwMode="auto">
+          <a:xfrm>
+            <a:off x="3877524" y="2760722"/>
+            <a:ext cx="1336196" cy="1321702"/>
           </a:xfrm>
           <a:prstGeom prst="rect">
             <a:avLst/>

</xml_diff>

<commit_message>
Add appllication images to presentation
</commit_message>
<xml_diff>
--- a/Documents/Timeless_Navigators.pptx
+++ b/Documents/Timeless_Navigators.pptx
@@ -36748,6 +36748,230 @@
           </p:txBody>
         </p:sp>
       </p:grpSp>
+      <p:pic>
+        <p:nvPicPr>
+          <p:cNvPr id="3" name="Картина 2" descr="Картина, която съдържа екранна снимка, текст&#10;&#10;Описанието е генерирано автоматично">
+            <a:extLst>
+              <a:ext uri="{FF2B5EF4-FFF2-40B4-BE49-F238E27FC236}">
+                <a16:creationId xmlns:a16="http://schemas.microsoft.com/office/drawing/2014/main" id="{D4F88875-F42A-C930-66B3-459398103ADC}"/>
+              </a:ext>
+            </a:extLst>
+          </p:cNvPr>
+          <p:cNvPicPr>
+            <a:picLocks noChangeAspect="1"/>
+          </p:cNvPicPr>
+          <p:nvPr/>
+        </p:nvPicPr>
+        <p:blipFill rotWithShape="1">
+          <a:blip r:embed="rId3"/>
+          <a:srcRect b="51793"/>
+          <a:stretch/>
+        </p:blipFill>
+        <p:spPr>
+          <a:xfrm>
+            <a:off x="3720128" y="199519"/>
+            <a:ext cx="4378220" cy="1669247"/>
+          </a:xfrm>
+          <a:prstGeom prst="rect">
+            <a:avLst/>
+          </a:prstGeom>
+          <a:ln w="38100" cap="sq">
+            <a:solidFill>
+              <a:schemeClr val="bg2"/>
+            </a:solidFill>
+            <a:prstDash val="solid"/>
+            <a:miter lim="800000"/>
+          </a:ln>
+          <a:effectLst>
+            <a:outerShdw blurRad="63500" sx="102000" sy="102000" algn="ctr" rotWithShape="0">
+              <a:prstClr val="black">
+                <a:alpha val="40000"/>
+              </a:prstClr>
+            </a:outerShdw>
+          </a:effectLst>
+        </p:spPr>
+      </p:pic>
+      <p:pic>
+        <p:nvPicPr>
+          <p:cNvPr id="5" name="Картина 4" descr="Картина, която съдържа екранна снимка, текст&#10;&#10;Описанието е генерирано автоматично">
+            <a:extLst>
+              <a:ext uri="{FF2B5EF4-FFF2-40B4-BE49-F238E27FC236}">
+                <a16:creationId xmlns:a16="http://schemas.microsoft.com/office/drawing/2014/main" id="{CC00BE0E-83B5-B4E4-034C-9CA98BC52A2B}"/>
+              </a:ext>
+            </a:extLst>
+          </p:cNvPr>
+          <p:cNvPicPr>
+            <a:picLocks noChangeAspect="1"/>
+          </p:cNvPicPr>
+          <p:nvPr/>
+        </p:nvPicPr>
+        <p:blipFill rotWithShape="1">
+          <a:blip r:embed="rId4"/>
+          <a:srcRect b="65114"/>
+          <a:stretch/>
+        </p:blipFill>
+        <p:spPr>
+          <a:xfrm>
+            <a:off x="71553" y="2083312"/>
+            <a:ext cx="4378221" cy="1208852"/>
+          </a:xfrm>
+          <a:prstGeom prst="rect">
+            <a:avLst/>
+          </a:prstGeom>
+          <a:ln w="38100" cap="sq">
+            <a:solidFill>
+              <a:schemeClr val="bg2"/>
+            </a:solidFill>
+            <a:prstDash val="solid"/>
+            <a:miter lim="800000"/>
+          </a:ln>
+          <a:effectLst>
+            <a:outerShdw blurRad="63500" sx="102000" sy="102000" algn="ctr" rotWithShape="0">
+              <a:prstClr val="black">
+                <a:alpha val="40000"/>
+              </a:prstClr>
+            </a:outerShdw>
+          </a:effectLst>
+        </p:spPr>
+      </p:pic>
+      <p:pic>
+        <p:nvPicPr>
+          <p:cNvPr id="7" name="Картина 6" descr="Картина, която съдържа екранна снимка, текст, софтуер&#10;&#10;Описанието е генерирано автоматично">
+            <a:extLst>
+              <a:ext uri="{FF2B5EF4-FFF2-40B4-BE49-F238E27FC236}">
+                <a16:creationId xmlns:a16="http://schemas.microsoft.com/office/drawing/2014/main" id="{3D1C1F98-1910-B797-F0EB-03623445EE54}"/>
+              </a:ext>
+            </a:extLst>
+          </p:cNvPr>
+          <p:cNvPicPr>
+            <a:picLocks noChangeAspect="1"/>
+          </p:cNvPicPr>
+          <p:nvPr/>
+        </p:nvPicPr>
+        <p:blipFill rotWithShape="1">
+          <a:blip r:embed="rId5"/>
+          <a:srcRect b="53998"/>
+          <a:stretch/>
+        </p:blipFill>
+        <p:spPr>
+          <a:xfrm>
+            <a:off x="4181244" y="3506711"/>
+            <a:ext cx="3695586" cy="1343843"/>
+          </a:xfrm>
+          <a:prstGeom prst="rect">
+            <a:avLst/>
+          </a:prstGeom>
+          <a:ln w="38100" cap="sq">
+            <a:solidFill>
+              <a:schemeClr val="bg2"/>
+            </a:solidFill>
+            <a:prstDash val="solid"/>
+            <a:miter lim="800000"/>
+          </a:ln>
+          <a:effectLst>
+            <a:outerShdw blurRad="63500" sx="102000" sy="102000" algn="ctr" rotWithShape="0">
+              <a:prstClr val="black">
+                <a:alpha val="40000"/>
+              </a:prstClr>
+            </a:outerShdw>
+          </a:effectLst>
+        </p:spPr>
+      </p:pic>
+      <p:cxnSp>
+        <p:nvCxnSpPr>
+          <p:cNvPr id="42" name="Съединител: с чупка 41">
+            <a:extLst>
+              <a:ext uri="{FF2B5EF4-FFF2-40B4-BE49-F238E27FC236}">
+                <a16:creationId xmlns:a16="http://schemas.microsoft.com/office/drawing/2014/main" id="{0B93ECE0-93BA-95BB-E5B1-60319AFA3BB3}"/>
+              </a:ext>
+            </a:extLst>
+          </p:cNvPr>
+          <p:cNvCxnSpPr>
+            <a:cxnSpLocks/>
+          </p:cNvCxnSpPr>
+          <p:nvPr/>
+        </p:nvCxnSpPr>
+        <p:spPr>
+          <a:xfrm rot="10800000" flipV="1">
+            <a:off x="2260665" y="1036508"/>
+            <a:ext cx="1459463" cy="1022215"/>
+          </a:xfrm>
+          <a:prstGeom prst="bentConnector2">
+            <a:avLst/>
+          </a:prstGeom>
+          <a:ln w="38100" cap="flat" cmpd="sng" algn="ctr">
+            <a:solidFill>
+              <a:schemeClr val="dk1"/>
+            </a:solidFill>
+            <a:prstDash val="solid"/>
+            <a:round/>
+            <a:headEnd type="none" w="med" len="med"/>
+            <a:tailEnd type="arrow" w="med" len="med"/>
+          </a:ln>
+        </p:spPr>
+        <p:style>
+          <a:lnRef idx="0">
+            <a:scrgbClr r="0" g="0" b="0"/>
+          </a:lnRef>
+          <a:fillRef idx="0">
+            <a:scrgbClr r="0" g="0" b="0"/>
+          </a:fillRef>
+          <a:effectRef idx="0">
+            <a:scrgbClr r="0" g="0" b="0"/>
+          </a:effectRef>
+          <a:fontRef idx="minor">
+            <a:schemeClr val="tx1"/>
+          </a:fontRef>
+        </p:style>
+      </p:cxnSp>
+      <p:cxnSp>
+        <p:nvCxnSpPr>
+          <p:cNvPr id="44" name="Съединител: с чупка 43">
+            <a:extLst>
+              <a:ext uri="{FF2B5EF4-FFF2-40B4-BE49-F238E27FC236}">
+                <a16:creationId xmlns:a16="http://schemas.microsoft.com/office/drawing/2014/main" id="{CB3B17D2-BEBB-6CAB-5206-0F34166D4024}"/>
+              </a:ext>
+            </a:extLst>
+          </p:cNvPr>
+          <p:cNvCxnSpPr>
+            <a:stCxn id="5" idx="3"/>
+            <a:endCxn id="7" idx="0"/>
+          </p:cNvCxnSpPr>
+          <p:nvPr/>
+        </p:nvCxnSpPr>
+        <p:spPr>
+          <a:xfrm>
+            <a:off x="4449774" y="2687738"/>
+            <a:ext cx="1579263" cy="818973"/>
+          </a:xfrm>
+          <a:prstGeom prst="bentConnector2">
+            <a:avLst/>
+          </a:prstGeom>
+          <a:ln w="38100" cap="flat" cmpd="sng" algn="ctr">
+            <a:solidFill>
+              <a:schemeClr val="dk1"/>
+            </a:solidFill>
+            <a:prstDash val="solid"/>
+            <a:round/>
+            <a:headEnd type="none" w="med" len="med"/>
+            <a:tailEnd type="arrow" w="med" len="med"/>
+          </a:ln>
+        </p:spPr>
+        <p:style>
+          <a:lnRef idx="0">
+            <a:scrgbClr r="0" g="0" b="0"/>
+          </a:lnRef>
+          <a:fillRef idx="0">
+            <a:scrgbClr r="0" g="0" b="0"/>
+          </a:fillRef>
+          <a:effectRef idx="0">
+            <a:scrgbClr r="0" g="0" b="0"/>
+          </a:effectRef>
+          <a:fontRef idx="minor">
+            <a:schemeClr val="tx1"/>
+          </a:fontRef>
+        </p:style>
+      </p:cxnSp>
     </p:spTree>
   </p:cSld>
   <p:clrMapOvr>

</xml_diff>